<commit_message>
Vectorized head module of poster
</commit_message>
<xml_diff>
--- a/dsg-poster-vorlage.pptx
+++ b/dsg-poster-vorlage.pptx
@@ -3997,6 +3997,47 @@
           <a:chExt cx="0" cy="0"/>
         </a:xfrm>
       </p:grpSpPr>
+      <p:pic>
+        <p:nvPicPr>
+          <p:cNvPr id="1135" name="Picture 111" descr="Z:\lehre\Vorlagen\Uni Layout Hilfen\Kopfmodul_Logo_große_Darstellung_quer_ohne_text.emf"/>
+          <p:cNvPicPr>
+            <a:picLocks noChangeAspect="1" noChangeArrowheads="1"/>
+          </p:cNvPicPr>
+          <p:nvPr/>
+        </p:nvPicPr>
+        <p:blipFill>
+          <a:blip r:embed="rId3">
+            <a:extLst>
+              <a:ext uri="{28A0092B-C50C-407E-A947-70E740481C1C}">
+                <a14:useLocalDpi xmlns:a14="http://schemas.microsoft.com/office/drawing/2010/main" val="0"/>
+              </a:ext>
+            </a:extLst>
+          </a:blip>
+          <a:srcRect/>
+          <a:stretch>
+            <a:fillRect/>
+          </a:stretch>
+        </p:blipFill>
+        <p:spPr bwMode="auto">
+          <a:xfrm>
+            <a:off x="-4764" y="-3392"/>
+            <a:ext cx="30290400" cy="5047410"/>
+          </a:xfrm>
+          <a:prstGeom prst="rect">
+            <a:avLst/>
+          </a:prstGeom>
+          <a:noFill/>
+          <a:extLst>
+            <a:ext uri="{909E8E84-426E-40DD-AFC4-6F175D3DCCD1}">
+              <a14:hiddenFill xmlns:a14="http://schemas.microsoft.com/office/drawing/2010/main">
+                <a:solidFill>
+                  <a:srgbClr val="FFFFFF"/>
+                </a:solidFill>
+              </a14:hiddenFill>
+            </a:ext>
+          </a:extLst>
+        </p:spPr>
+      </p:pic>
       <p:sp>
         <p:nvSpPr>
           <p:cNvPr id="2059" name="Text Box 401"/>
@@ -4038,6 +4079,16 @@
           </a:lstStyle>
           <a:p>
             <a:r>
+              <a:rPr lang="pt-BR" dirty="0" smtClean="0">
+                <a:solidFill>
+                  <a:schemeClr val="bg1"/>
+                </a:solidFill>
+                <a:latin typeface="Arial" panose="020B0604020202020204" pitchFamily="34" charset="0"/>
+                <a:cs typeface="Arial" panose="020B0604020202020204" pitchFamily="34" charset="0"/>
+              </a:rPr>
+              <a:t> Participants</a:t>
+            </a:r>
+            <a:r>
               <a:rPr lang="pt-BR" dirty="0">
                 <a:solidFill>
                   <a:schemeClr val="bg1"/>
@@ -4045,7 +4096,7 @@
                 <a:latin typeface="Arial" panose="020B0604020202020204" pitchFamily="34" charset="0"/>
                 <a:cs typeface="Arial" panose="020B0604020202020204" pitchFamily="34" charset="0"/>
               </a:rPr>
-              <a:t>Participants: </a:t>
+              <a:t>: </a:t>
             </a:r>
             <a:r>
               <a:rPr lang="pt-BR" dirty="0" smtClean="0">
@@ -4055,7 +4106,7 @@
                 <a:latin typeface="Arial" panose="020B0604020202020204" pitchFamily="34" charset="0"/>
                 <a:cs typeface="Arial" panose="020B0604020202020204" pitchFamily="34" charset="0"/>
               </a:rPr>
-              <a:t>Alan Turing																 Supervisors</a:t>
+              <a:t>Alan Turing															 Supervisors</a:t>
             </a:r>
             <a:r>
               <a:rPr lang="pt-BR" dirty="0">
@@ -4306,48 +4357,6 @@
       </p:sp>
       <p:sp>
         <p:nvSpPr>
-          <p:cNvPr id="5" name="Rechteck 4"/>
-          <p:cNvSpPr/>
-          <p:nvPr/>
-        </p:nvSpPr>
-        <p:spPr bwMode="auto">
-          <a:xfrm>
-            <a:off x="-4765" y="-2649"/>
-            <a:ext cx="30284740" cy="5112813"/>
-          </a:xfrm>
-          <a:prstGeom prst="rect">
-            <a:avLst/>
-          </a:prstGeom>
-          <a:solidFill>
-            <a:srgbClr val="00407A"/>
-          </a:solidFill>
-          <a:ln w="9525" cap="flat" cmpd="sng" algn="ctr">
-            <a:noFill/>
-            <a:prstDash val="solid"/>
-            <a:round/>
-            <a:headEnd type="none" w="med" len="med"/>
-            <a:tailEnd type="none" w="med" len="med"/>
-          </a:ln>
-          <a:effectLst/>
-        </p:spPr>
-        <p:txBody>
-          <a:bodyPr vert="horz" wrap="square" lIns="91440" tIns="45720" rIns="91440" bIns="45720" numCol="1" rtlCol="0" anchor="t" anchorCtr="0" compatLnSpc="1">
-            <a:prstTxWarp prst="textNoShape">
-              <a:avLst/>
-            </a:prstTxWarp>
-          </a:bodyPr>
-          <a:lstStyle/>
-          <a:p>
-            <a:pPr defTabSz="4176413"/>
-            <a:endParaRPr lang="de-DE" dirty="0">
-              <a:latin typeface="Arial" panose="020B0604020202020204" pitchFamily="34" charset="0"/>
-              <a:cs typeface="Arial" panose="020B0604020202020204" pitchFamily="34" charset="0"/>
-            </a:endParaRPr>
-          </a:p>
-        </p:txBody>
-      </p:sp>
-      <p:sp>
-        <p:nvSpPr>
           <p:cNvPr id="101" name="Text Box 7"/>
           <p:cNvSpPr txBox="1">
             <a:spLocks noChangeArrowheads="1"/>
@@ -4356,7 +4365,7 @@
         </p:nvSpPr>
         <p:spPr bwMode="auto">
           <a:xfrm>
-            <a:off x="424238" y="414336"/>
+            <a:off x="181635" y="434284"/>
             <a:ext cx="29760202" cy="4407908"/>
           </a:xfrm>
           <a:prstGeom prst="rect">
@@ -4496,107 +4505,122 @@
           </a:p>
         </p:txBody>
       </p:sp>
-      <p:sp>
-        <p:nvSpPr>
-          <p:cNvPr id="9" name="Rechteck 8"/>
-          <p:cNvSpPr/>
+      <p:grpSp>
+        <p:nvGrpSpPr>
+          <p:cNvPr id="2" name="Gruppieren 1"/>
+          <p:cNvGrpSpPr/>
           <p:nvPr/>
-        </p:nvSpPr>
-        <p:spPr>
+        </p:nvGrpSpPr>
+        <p:grpSpPr>
           <a:xfrm>
-            <a:off x="716333" y="527049"/>
-            <a:ext cx="4255750" cy="4084525"/>
+            <a:off x="646747" y="670522"/>
+            <a:ext cx="3610908" cy="3497300"/>
+            <a:chOff x="716333" y="527049"/>
+            <a:chExt cx="4255750" cy="4121853"/>
           </a:xfrm>
-          <a:prstGeom prst="rect">
-            <a:avLst/>
-          </a:prstGeom>
-          <a:solidFill>
-            <a:schemeClr val="bg1"/>
-          </a:solidFill>
-          <a:ln>
+        </p:grpSpPr>
+        <p:sp>
+          <p:nvSpPr>
+            <p:cNvPr id="9" name="Rechteck 8"/>
+            <p:cNvSpPr/>
+            <p:nvPr/>
+          </p:nvSpPr>
+          <p:spPr>
+            <a:xfrm>
+              <a:off x="716333" y="527049"/>
+              <a:ext cx="4255750" cy="4084525"/>
+            </a:xfrm>
+            <a:prstGeom prst="rect">
+              <a:avLst/>
+            </a:prstGeom>
             <a:solidFill>
-              <a:schemeClr val="bg1">
-                <a:lumMod val="50000"/>
+              <a:schemeClr val="bg1"/>
+            </a:solidFill>
+            <a:ln>
+              <a:solidFill>
+                <a:schemeClr val="bg1">
+                  <a:lumMod val="50000"/>
+                </a:schemeClr>
+              </a:solidFill>
+            </a:ln>
+            <a:effectLst>
+              <a:outerShdw blurRad="177800" dist="139700" dir="2700000" algn="tl" rotWithShape="0">
+                <a:prstClr val="black">
+                  <a:alpha val="20000"/>
+                </a:prstClr>
+              </a:outerShdw>
+            </a:effectLst>
+          </p:spPr>
+          <p:style>
+            <a:lnRef idx="2">
+              <a:schemeClr val="accent1">
+                <a:shade val="50000"/>
               </a:schemeClr>
-            </a:solidFill>
-          </a:ln>
-          <a:effectLst>
-            <a:outerShdw blurRad="177800" dist="139700" dir="2700000" algn="tl" rotWithShape="0">
-              <a:prstClr val="black">
-                <a:alpha val="20000"/>
-              </a:prstClr>
-            </a:outerShdw>
-          </a:effectLst>
-        </p:spPr>
-        <p:style>
-          <a:lnRef idx="2">
-            <a:schemeClr val="accent1">
-              <a:shade val="50000"/>
-            </a:schemeClr>
-          </a:lnRef>
-          <a:fillRef idx="1">
-            <a:schemeClr val="accent1"/>
-          </a:fillRef>
-          <a:effectRef idx="0">
-            <a:schemeClr val="accent1"/>
-          </a:effectRef>
-          <a:fontRef idx="minor">
-            <a:schemeClr val="lt1"/>
-          </a:fontRef>
-        </p:style>
-        <p:txBody>
-          <a:bodyPr rtlCol="0" anchor="ctr"/>
-          <a:lstStyle/>
-          <a:p>
-            <a:pPr algn="ctr"/>
-            <a:endParaRPr lang="de-DE">
-              <a:latin typeface="Arial" panose="020B0604020202020204" pitchFamily="34" charset="0"/>
-              <a:cs typeface="Arial" panose="020B0604020202020204" pitchFamily="34" charset="0"/>
-            </a:endParaRPr>
-          </a:p>
-        </p:txBody>
-      </p:sp>
-      <p:pic>
-        <p:nvPicPr>
-          <p:cNvPr id="102" name="Picture 145" descr="Y:\lehre\Vorlagen\Lehrstuhl Logos\2007-04-13\vs-transparent-gross.png"/>
-          <p:cNvPicPr>
-            <a:picLocks noChangeAspect="1" noChangeArrowheads="1"/>
-          </p:cNvPicPr>
-          <p:nvPr/>
-        </p:nvPicPr>
-        <p:blipFill>
-          <a:blip r:embed="rId3">
+            </a:lnRef>
+            <a:fillRef idx="1">
+              <a:schemeClr val="accent1"/>
+            </a:fillRef>
+            <a:effectRef idx="0">
+              <a:schemeClr val="accent1"/>
+            </a:effectRef>
+            <a:fontRef idx="minor">
+              <a:schemeClr val="lt1"/>
+            </a:fontRef>
+          </p:style>
+          <p:txBody>
+            <a:bodyPr rtlCol="0" anchor="ctr"/>
+            <a:lstStyle/>
+            <a:p>
+              <a:pPr algn="ctr"/>
+              <a:endParaRPr lang="de-DE">
+                <a:latin typeface="Arial" panose="020B0604020202020204" pitchFamily="34" charset="0"/>
+                <a:cs typeface="Arial" panose="020B0604020202020204" pitchFamily="34" charset="0"/>
+              </a:endParaRPr>
+            </a:p>
+          </p:txBody>
+        </p:sp>
+        <p:pic>
+          <p:nvPicPr>
+            <p:cNvPr id="102" name="Picture 145" descr="Y:\lehre\Vorlagen\Lehrstuhl Logos\2007-04-13\vs-transparent-gross.png"/>
+            <p:cNvPicPr>
+              <a:picLocks noChangeAspect="1" noChangeArrowheads="1"/>
+            </p:cNvPicPr>
+            <p:nvPr/>
+          </p:nvPicPr>
+          <p:blipFill>
+            <a:blip r:embed="rId4">
+              <a:extLst>
+                <a:ext uri="{28A0092B-C50C-407E-A947-70E740481C1C}">
+                  <a14:useLocalDpi xmlns:a14="http://schemas.microsoft.com/office/drawing/2010/main" val="0"/>
+                </a:ext>
+              </a:extLst>
+            </a:blip>
+            <a:srcRect/>
+            <a:stretch>
+              <a:fillRect/>
+            </a:stretch>
+          </p:blipFill>
+          <p:spPr bwMode="auto">
+            <a:xfrm>
+              <a:off x="766426" y="564377"/>
+              <a:ext cx="4192682" cy="4084525"/>
+            </a:xfrm>
+            <a:prstGeom prst="rect">
+              <a:avLst/>
+            </a:prstGeom>
+            <a:noFill/>
             <a:extLst>
-              <a:ext uri="{28A0092B-C50C-407E-A947-70E740481C1C}">
-                <a14:useLocalDpi xmlns:a14="http://schemas.microsoft.com/office/drawing/2010/main" val="0"/>
+              <a:ext uri="{909E8E84-426E-40DD-AFC4-6F175D3DCCD1}">
+                <a14:hiddenFill xmlns:a14="http://schemas.microsoft.com/office/drawing/2010/main">
+                  <a:solidFill>
+                    <a:srgbClr val="FFFFFF"/>
+                  </a:solidFill>
+                </a14:hiddenFill>
               </a:ext>
             </a:extLst>
-          </a:blip>
-          <a:srcRect/>
-          <a:stretch>
-            <a:fillRect/>
-          </a:stretch>
-        </p:blipFill>
-        <p:spPr bwMode="auto">
-          <a:xfrm>
-            <a:off x="766426" y="564377"/>
-            <a:ext cx="4192682" cy="4084525"/>
-          </a:xfrm>
-          <a:prstGeom prst="rect">
-            <a:avLst/>
-          </a:prstGeom>
-          <a:noFill/>
-          <a:extLst>
-            <a:ext uri="{909E8E84-426E-40DD-AFC4-6F175D3DCCD1}">
-              <a14:hiddenFill xmlns:a14="http://schemas.microsoft.com/office/drawing/2010/main">
-                <a:solidFill>
-                  <a:srgbClr val="FFFFFF"/>
-                </a:solidFill>
-              </a14:hiddenFill>
-            </a:ext>
-          </a:extLst>
-        </p:spPr>
-      </p:pic>
+          </p:spPr>
+        </p:pic>
+      </p:grpSp>
       <p:sp>
         <p:nvSpPr>
           <p:cNvPr id="74" name="Rechteck 141"/>
@@ -4722,10 +4746,6 @@
               </a:rPr>
               <a:t>Course Semester</a:t>
             </a:r>
-            <a:endParaRPr lang="en-US" sz="7200" b="1" dirty="0" smtClean="0">
-              <a:latin typeface="Arial" panose="020B0604020202020204" pitchFamily="34" charset="0"/>
-              <a:cs typeface="Arial" panose="020B0604020202020204" pitchFamily="34" charset="0"/>
-            </a:endParaRPr>
           </a:p>
           <a:p>
             <a:pPr algn="ctr"/>
@@ -4769,147 +4789,6 @@
           </a:p>
         </p:txBody>
       </p:sp>
-      <p:sp>
-        <p:nvSpPr>
-          <p:cNvPr id="17" name="Rechtwinkliges Dreieck 16"/>
-          <p:cNvSpPr/>
-          <p:nvPr/>
-        </p:nvSpPr>
-        <p:spPr>
-          <a:xfrm rot="10800000">
-            <a:off x="27767947" y="-2649"/>
-            <a:ext cx="2520315" cy="2520315"/>
-          </a:xfrm>
-          <a:prstGeom prst="rtTriangle">
-            <a:avLst/>
-          </a:prstGeom>
-          <a:solidFill>
-            <a:schemeClr val="bg1"/>
-          </a:solidFill>
-          <a:ln>
-            <a:solidFill>
-              <a:schemeClr val="bg1"/>
-            </a:solidFill>
-          </a:ln>
-        </p:spPr>
-        <p:style>
-          <a:lnRef idx="2">
-            <a:schemeClr val="accent1">
-              <a:shade val="50000"/>
-            </a:schemeClr>
-          </a:lnRef>
-          <a:fillRef idx="1">
-            <a:schemeClr val="accent1"/>
-          </a:fillRef>
-          <a:effectRef idx="0">
-            <a:schemeClr val="accent1"/>
-          </a:effectRef>
-          <a:fontRef idx="minor">
-            <a:schemeClr val="lt1"/>
-          </a:fontRef>
-        </p:style>
-        <p:txBody>
-          <a:bodyPr rtlCol="0" anchor="ctr"/>
-          <a:lstStyle/>
-          <a:p>
-            <a:pPr algn="ctr"/>
-            <a:endParaRPr lang="de-DE">
-              <a:latin typeface="Arial" panose="020B0604020202020204" pitchFamily="34" charset="0"/>
-              <a:cs typeface="Arial" panose="020B0604020202020204" pitchFamily="34" charset="0"/>
-            </a:endParaRPr>
-          </a:p>
-        </p:txBody>
-      </p:sp>
-      <p:sp>
-        <p:nvSpPr>
-          <p:cNvPr id="14" name="Ellipse 13"/>
-          <p:cNvSpPr/>
-          <p:nvPr/>
-        </p:nvSpPr>
-        <p:spPr>
-          <a:xfrm rot="10800000">
-            <a:off x="25243064" y="-2649"/>
-            <a:ext cx="5040630" cy="5040630"/>
-          </a:xfrm>
-          <a:prstGeom prst="ellipse">
-            <a:avLst/>
-          </a:prstGeom>
-          <a:solidFill>
-            <a:srgbClr val="00407A"/>
-          </a:solidFill>
-          <a:ln>
-            <a:noFill/>
-          </a:ln>
-        </p:spPr>
-        <p:style>
-          <a:lnRef idx="2">
-            <a:schemeClr val="accent1">
-              <a:shade val="50000"/>
-            </a:schemeClr>
-          </a:lnRef>
-          <a:fillRef idx="1">
-            <a:schemeClr val="accent1"/>
-          </a:fillRef>
-          <a:effectRef idx="0">
-            <a:schemeClr val="accent1"/>
-          </a:effectRef>
-          <a:fontRef idx="minor">
-            <a:schemeClr val="lt1"/>
-          </a:fontRef>
-        </p:style>
-        <p:txBody>
-          <a:bodyPr rtlCol="0" anchor="ctr"/>
-          <a:lstStyle/>
-          <a:p>
-            <a:pPr algn="ctr"/>
-            <a:endParaRPr lang="de-DE">
-              <a:latin typeface="Arial" panose="020B0604020202020204" pitchFamily="34" charset="0"/>
-              <a:cs typeface="Arial" panose="020B0604020202020204" pitchFamily="34" charset="0"/>
-            </a:endParaRPr>
-          </a:p>
-        </p:txBody>
-      </p:sp>
-      <p:pic>
-        <p:nvPicPr>
-          <p:cNvPr id="20" name="Picture 9" descr="C:\Users\sh\Pictures\Otto-Friedrich-Universität_Bamberg_logo.png"/>
-          <p:cNvPicPr>
-            <a:picLocks noChangeAspect="1" noChangeArrowheads="1"/>
-          </p:cNvPicPr>
-          <p:nvPr/>
-        </p:nvPicPr>
-        <p:blipFill>
-          <a:blip r:embed="rId4">
-            <a:extLst>
-              <a:ext uri="{28A0092B-C50C-407E-A947-70E740481C1C}">
-                <a14:useLocalDpi xmlns:a14="http://schemas.microsoft.com/office/drawing/2010/main" val="0"/>
-              </a:ext>
-            </a:extLst>
-          </a:blip>
-          <a:srcRect/>
-          <a:stretch>
-            <a:fillRect/>
-          </a:stretch>
-        </p:blipFill>
-        <p:spPr bwMode="auto">
-          <a:xfrm>
-            <a:off x="24924067" y="318001"/>
-            <a:ext cx="4977765" cy="4977765"/>
-          </a:xfrm>
-          <a:prstGeom prst="rect">
-            <a:avLst/>
-          </a:prstGeom>
-          <a:noFill/>
-          <a:extLst>
-            <a:ext uri="{909E8E84-426E-40DD-AFC4-6F175D3DCCD1}">
-              <a14:hiddenFill xmlns:a14="http://schemas.microsoft.com/office/drawing/2010/main">
-                <a:solidFill>
-                  <a:srgbClr val="FFFFFF"/>
-                </a:solidFill>
-              </a14:hiddenFill>
-            </a:ext>
-          </a:extLst>
-        </p:spPr>
-      </p:pic>
     </p:spTree>
   </p:cSld>
   <p:clrMapOvr>

</xml_diff>